<commit_message>
doc ciclo vida y nuevo apk con hector y ernesto sin maquetar
</commit_message>
<xml_diff>
--- a/ESQUEMA CURSO.pptx
+++ b/ESQUEMA CURSO.pptx
@@ -6,6 +6,7 @@
   </p:sldMasterIdLst>
   <p:sldIdLst>
     <p:sldId id="256" r:id="rId2"/>
+    <p:sldId id="257" r:id="rId3"/>
   </p:sldIdLst>
   <p:sldSz cx="12192000" cy="6858000"/>
   <p:notesSz cx="6858000" cy="9144000"/>
@@ -104,6 +105,11 @@
       </a:defRPr>
     </a:lvl9pPr>
   </p:defaultTextStyle>
+  <p:extLst>
+    <p:ext uri="{EFAFB233-063F-42B5-8137-9DF3F51BA10A}">
+      <p15:sldGuideLst xmlns:p15="http://schemas.microsoft.com/office/powerpoint/2012/main"/>
+    </p:ext>
+  </p:extLst>
 </p:presentation>
 </file>
 
@@ -238,7 +244,7 @@
           <a:p>
             <a:fld id="{6BA1E887-5853-45CF-A3E8-C09A4AFE1735}" type="datetimeFigureOut">
               <a:rPr lang="es-ES" smtClean="0"/>
-              <a:t>25/01/2021</a:t>
+              <a:t>01/02/2021</a:t>
             </a:fld>
             <a:endParaRPr lang="es-ES"/>
           </a:p>
@@ -408,7 +414,7 @@
           <a:p>
             <a:fld id="{6BA1E887-5853-45CF-A3E8-C09A4AFE1735}" type="datetimeFigureOut">
               <a:rPr lang="es-ES" smtClean="0"/>
-              <a:t>25/01/2021</a:t>
+              <a:t>01/02/2021</a:t>
             </a:fld>
             <a:endParaRPr lang="es-ES"/>
           </a:p>
@@ -588,7 +594,7 @@
           <a:p>
             <a:fld id="{6BA1E887-5853-45CF-A3E8-C09A4AFE1735}" type="datetimeFigureOut">
               <a:rPr lang="es-ES" smtClean="0"/>
-              <a:t>25/01/2021</a:t>
+              <a:t>01/02/2021</a:t>
             </a:fld>
             <a:endParaRPr lang="es-ES"/>
           </a:p>
@@ -758,7 +764,7 @@
           <a:p>
             <a:fld id="{6BA1E887-5853-45CF-A3E8-C09A4AFE1735}" type="datetimeFigureOut">
               <a:rPr lang="es-ES" smtClean="0"/>
-              <a:t>25/01/2021</a:t>
+              <a:t>01/02/2021</a:t>
             </a:fld>
             <a:endParaRPr lang="es-ES"/>
           </a:p>
@@ -1004,7 +1010,7 @@
           <a:p>
             <a:fld id="{6BA1E887-5853-45CF-A3E8-C09A4AFE1735}" type="datetimeFigureOut">
               <a:rPr lang="es-ES" smtClean="0"/>
-              <a:t>25/01/2021</a:t>
+              <a:t>01/02/2021</a:t>
             </a:fld>
             <a:endParaRPr lang="es-ES"/>
           </a:p>
@@ -1236,7 +1242,7 @@
           <a:p>
             <a:fld id="{6BA1E887-5853-45CF-A3E8-C09A4AFE1735}" type="datetimeFigureOut">
               <a:rPr lang="es-ES" smtClean="0"/>
-              <a:t>25/01/2021</a:t>
+              <a:t>01/02/2021</a:t>
             </a:fld>
             <a:endParaRPr lang="es-ES"/>
           </a:p>
@@ -1603,7 +1609,7 @@
           <a:p>
             <a:fld id="{6BA1E887-5853-45CF-A3E8-C09A4AFE1735}" type="datetimeFigureOut">
               <a:rPr lang="es-ES" smtClean="0"/>
-              <a:t>25/01/2021</a:t>
+              <a:t>01/02/2021</a:t>
             </a:fld>
             <a:endParaRPr lang="es-ES"/>
           </a:p>
@@ -1721,7 +1727,7 @@
           <a:p>
             <a:fld id="{6BA1E887-5853-45CF-A3E8-C09A4AFE1735}" type="datetimeFigureOut">
               <a:rPr lang="es-ES" smtClean="0"/>
-              <a:t>25/01/2021</a:t>
+              <a:t>01/02/2021</a:t>
             </a:fld>
             <a:endParaRPr lang="es-ES"/>
           </a:p>
@@ -1816,7 +1822,7 @@
           <a:p>
             <a:fld id="{6BA1E887-5853-45CF-A3E8-C09A4AFE1735}" type="datetimeFigureOut">
               <a:rPr lang="es-ES" smtClean="0"/>
-              <a:t>25/01/2021</a:t>
+              <a:t>01/02/2021</a:t>
             </a:fld>
             <a:endParaRPr lang="es-ES"/>
           </a:p>
@@ -2093,7 +2099,7 @@
           <a:p>
             <a:fld id="{6BA1E887-5853-45CF-A3E8-C09A4AFE1735}" type="datetimeFigureOut">
               <a:rPr lang="es-ES" smtClean="0"/>
-              <a:t>25/01/2021</a:t>
+              <a:t>01/02/2021</a:t>
             </a:fld>
             <a:endParaRPr lang="es-ES"/>
           </a:p>
@@ -2346,7 +2352,7 @@
           <a:p>
             <a:fld id="{6BA1E887-5853-45CF-A3E8-C09A4AFE1735}" type="datetimeFigureOut">
               <a:rPr lang="es-ES" smtClean="0"/>
-              <a:t>25/01/2021</a:t>
+              <a:t>01/02/2021</a:t>
             </a:fld>
             <a:endParaRPr lang="es-ES"/>
           </a:p>
@@ -2559,7 +2565,7 @@
           <a:p>
             <a:fld id="{6BA1E887-5853-45CF-A3E8-C09A4AFE1735}" type="datetimeFigureOut">
               <a:rPr lang="es-ES" smtClean="0"/>
-              <a:t>25/01/2021</a:t>
+              <a:t>01/02/2021</a:t>
             </a:fld>
             <a:endParaRPr lang="es-ES"/>
           </a:p>
@@ -3604,6 +3610,861 @@
 </p:sld>
 </file>
 
+<file path=ppt/slides/slide2.xml><?xml version="1.0" encoding="utf-8"?>
+<p:sld xmlns:a="http://schemas.openxmlformats.org/drawingml/2006/main" xmlns:r="http://schemas.openxmlformats.org/officeDocument/2006/relationships" xmlns:p="http://schemas.openxmlformats.org/presentationml/2006/main">
+  <p:cSld>
+    <p:spTree>
+      <p:nvGrpSpPr>
+        <p:cNvPr id="1" name=""/>
+        <p:cNvGrpSpPr/>
+        <p:nvPr/>
+      </p:nvGrpSpPr>
+      <p:grpSpPr>
+        <a:xfrm>
+          <a:off x="0" y="0"/>
+          <a:ext cx="0" cy="0"/>
+          <a:chOff x="0" y="0"/>
+          <a:chExt cx="0" cy="0"/>
+        </a:xfrm>
+      </p:grpSpPr>
+      <p:sp>
+        <p:nvSpPr>
+          <p:cNvPr id="2" name="CuadroTexto 1"/>
+          <p:cNvSpPr txBox="1"/>
+          <p:nvPr/>
+        </p:nvSpPr>
+        <p:spPr>
+          <a:xfrm>
+            <a:off x="3526971" y="303707"/>
+            <a:ext cx="4454435" cy="369332"/>
+          </a:xfrm>
+          <a:prstGeom prst="rect">
+            <a:avLst/>
+          </a:prstGeom>
+          <a:noFill/>
+        </p:spPr>
+        <p:txBody>
+          <a:bodyPr wrap="square" rtlCol="0">
+            <a:spAutoFit/>
+          </a:bodyPr>
+          <a:lstStyle/>
+          <a:p>
+            <a:r>
+              <a:rPr lang="es-ES" dirty="0" smtClean="0"/>
+              <a:t>CICLO DE VIDA DE UN PROYECTO SOFTWARE</a:t>
+            </a:r>
+            <a:endParaRPr lang="es-ES" dirty="0"/>
+          </a:p>
+        </p:txBody>
+      </p:sp>
+      <p:sp>
+        <p:nvSpPr>
+          <p:cNvPr id="3" name="Rectángulo redondeado 2"/>
+          <p:cNvSpPr/>
+          <p:nvPr/>
+        </p:nvSpPr>
+        <p:spPr>
+          <a:xfrm>
+            <a:off x="1397726" y="1188716"/>
+            <a:ext cx="2011680" cy="770709"/>
+          </a:xfrm>
+          <a:prstGeom prst="roundRect">
+            <a:avLst/>
+          </a:prstGeom>
+        </p:spPr>
+        <p:style>
+          <a:lnRef idx="2">
+            <a:schemeClr val="accent1">
+              <a:shade val="50000"/>
+            </a:schemeClr>
+          </a:lnRef>
+          <a:fillRef idx="1">
+            <a:schemeClr val="accent1"/>
+          </a:fillRef>
+          <a:effectRef idx="0">
+            <a:schemeClr val="accent1"/>
+          </a:effectRef>
+          <a:fontRef idx="minor">
+            <a:schemeClr val="lt1"/>
+          </a:fontRef>
+        </p:style>
+        <p:txBody>
+          <a:bodyPr rtlCol="0" anchor="ctr"/>
+          <a:lstStyle/>
+          <a:p>
+            <a:pPr algn="ctr"/>
+            <a:r>
+              <a:rPr lang="es-ES" dirty="0" smtClean="0"/>
+              <a:t>ANÁLISIS</a:t>
+            </a:r>
+            <a:endParaRPr lang="es-ES" dirty="0"/>
+          </a:p>
+        </p:txBody>
+      </p:sp>
+      <p:sp>
+        <p:nvSpPr>
+          <p:cNvPr id="7" name="Rectángulo 6"/>
+          <p:cNvSpPr/>
+          <p:nvPr/>
+        </p:nvSpPr>
+        <p:spPr>
+          <a:xfrm>
+            <a:off x="4362994" y="1227905"/>
+            <a:ext cx="1502229" cy="666205"/>
+          </a:xfrm>
+          <a:prstGeom prst="rect">
+            <a:avLst/>
+          </a:prstGeom>
+          <a:solidFill>
+            <a:schemeClr val="accent4"/>
+          </a:solidFill>
+        </p:spPr>
+        <p:style>
+          <a:lnRef idx="2">
+            <a:schemeClr val="accent1">
+              <a:shade val="50000"/>
+            </a:schemeClr>
+          </a:lnRef>
+          <a:fillRef idx="1">
+            <a:schemeClr val="accent1"/>
+          </a:fillRef>
+          <a:effectRef idx="0">
+            <a:schemeClr val="accent1"/>
+          </a:effectRef>
+          <a:fontRef idx="minor">
+            <a:schemeClr val="lt1"/>
+          </a:fontRef>
+        </p:style>
+        <p:txBody>
+          <a:bodyPr rtlCol="0" anchor="ctr"/>
+          <a:lstStyle/>
+          <a:p>
+            <a:pPr algn="ctr"/>
+            <a:r>
+              <a:rPr lang="es-ES" dirty="0" smtClean="0"/>
+              <a:t>QUÉ</a:t>
+            </a:r>
+            <a:endParaRPr lang="es-ES" dirty="0"/>
+          </a:p>
+        </p:txBody>
+      </p:sp>
+      <p:sp>
+        <p:nvSpPr>
+          <p:cNvPr id="20" name="Rectángulo redondeado 19"/>
+          <p:cNvSpPr/>
+          <p:nvPr/>
+        </p:nvSpPr>
+        <p:spPr>
+          <a:xfrm>
+            <a:off x="7363097" y="1175652"/>
+            <a:ext cx="2838993" cy="770709"/>
+          </a:xfrm>
+          <a:prstGeom prst="roundRect">
+            <a:avLst/>
+          </a:prstGeom>
+          <a:solidFill>
+            <a:schemeClr val="accent6"/>
+          </a:solidFill>
+        </p:spPr>
+        <p:style>
+          <a:lnRef idx="2">
+            <a:schemeClr val="accent1">
+              <a:shade val="50000"/>
+            </a:schemeClr>
+          </a:lnRef>
+          <a:fillRef idx="1">
+            <a:schemeClr val="accent1"/>
+          </a:fillRef>
+          <a:effectRef idx="0">
+            <a:schemeClr val="accent1"/>
+          </a:effectRef>
+          <a:fontRef idx="minor">
+            <a:schemeClr val="lt1"/>
+          </a:fontRef>
+        </p:style>
+        <p:txBody>
+          <a:bodyPr rtlCol="0" anchor="ctr"/>
+          <a:lstStyle/>
+          <a:p>
+            <a:pPr algn="ctr"/>
+            <a:r>
+              <a:rPr lang="es-ES" dirty="0" smtClean="0"/>
+              <a:t>IDEA ORIGINAL</a:t>
+            </a:r>
+          </a:p>
+          <a:p>
+            <a:pPr algn="ctr"/>
+            <a:r>
+              <a:rPr lang="es-ES" dirty="0" smtClean="0"/>
+              <a:t>FUNCIONALIDAD</a:t>
+            </a:r>
+          </a:p>
+          <a:p>
+            <a:pPr algn="ctr"/>
+            <a:r>
+              <a:rPr lang="es-ES" dirty="0" smtClean="0"/>
+              <a:t>DIAGRAMA CASOS DE USO</a:t>
+            </a:r>
+            <a:endParaRPr lang="es-ES" dirty="0"/>
+          </a:p>
+        </p:txBody>
+      </p:sp>
+      <p:sp>
+        <p:nvSpPr>
+          <p:cNvPr id="22" name="Rectángulo redondeado 21"/>
+          <p:cNvSpPr/>
+          <p:nvPr/>
+        </p:nvSpPr>
+        <p:spPr>
+          <a:xfrm>
+            <a:off x="1397726" y="2249766"/>
+            <a:ext cx="2011680" cy="770709"/>
+          </a:xfrm>
+          <a:prstGeom prst="roundRect">
+            <a:avLst/>
+          </a:prstGeom>
+        </p:spPr>
+        <p:style>
+          <a:lnRef idx="2">
+            <a:schemeClr val="accent1">
+              <a:shade val="50000"/>
+            </a:schemeClr>
+          </a:lnRef>
+          <a:fillRef idx="1">
+            <a:schemeClr val="accent1"/>
+          </a:fillRef>
+          <a:effectRef idx="0">
+            <a:schemeClr val="accent1"/>
+          </a:effectRef>
+          <a:fontRef idx="minor">
+            <a:schemeClr val="lt1"/>
+          </a:fontRef>
+        </p:style>
+        <p:txBody>
+          <a:bodyPr rtlCol="0" anchor="ctr"/>
+          <a:lstStyle/>
+          <a:p>
+            <a:pPr algn="ctr"/>
+            <a:r>
+              <a:rPr lang="es-ES" dirty="0" smtClean="0"/>
+              <a:t>DISEÑO</a:t>
+            </a:r>
+            <a:endParaRPr lang="es-ES" dirty="0"/>
+          </a:p>
+        </p:txBody>
+      </p:sp>
+      <p:sp>
+        <p:nvSpPr>
+          <p:cNvPr id="23" name="Rectángulo 22"/>
+          <p:cNvSpPr/>
+          <p:nvPr/>
+        </p:nvSpPr>
+        <p:spPr>
+          <a:xfrm>
+            <a:off x="4362994" y="2288955"/>
+            <a:ext cx="1502229" cy="666205"/>
+          </a:xfrm>
+          <a:prstGeom prst="rect">
+            <a:avLst/>
+          </a:prstGeom>
+          <a:solidFill>
+            <a:schemeClr val="accent4"/>
+          </a:solidFill>
+        </p:spPr>
+        <p:style>
+          <a:lnRef idx="2">
+            <a:schemeClr val="accent1">
+              <a:shade val="50000"/>
+            </a:schemeClr>
+          </a:lnRef>
+          <a:fillRef idx="1">
+            <a:schemeClr val="accent1"/>
+          </a:fillRef>
+          <a:effectRef idx="0">
+            <a:schemeClr val="accent1"/>
+          </a:effectRef>
+          <a:fontRef idx="minor">
+            <a:schemeClr val="lt1"/>
+          </a:fontRef>
+        </p:style>
+        <p:txBody>
+          <a:bodyPr rtlCol="0" anchor="ctr"/>
+          <a:lstStyle/>
+          <a:p>
+            <a:pPr algn="ctr"/>
+            <a:r>
+              <a:rPr lang="es-ES" dirty="0" smtClean="0"/>
+              <a:t>CÓMO</a:t>
+            </a:r>
+            <a:endParaRPr lang="es-ES" dirty="0"/>
+          </a:p>
+        </p:txBody>
+      </p:sp>
+      <p:sp>
+        <p:nvSpPr>
+          <p:cNvPr id="25" name="Rectángulo redondeado 24"/>
+          <p:cNvSpPr/>
+          <p:nvPr/>
+        </p:nvSpPr>
+        <p:spPr>
+          <a:xfrm>
+            <a:off x="7363097" y="2184450"/>
+            <a:ext cx="2838993" cy="770709"/>
+          </a:xfrm>
+          <a:prstGeom prst="roundRect">
+            <a:avLst/>
+          </a:prstGeom>
+          <a:solidFill>
+            <a:schemeClr val="accent6"/>
+          </a:solidFill>
+        </p:spPr>
+        <p:style>
+          <a:lnRef idx="2">
+            <a:schemeClr val="accent1">
+              <a:shade val="50000"/>
+            </a:schemeClr>
+          </a:lnRef>
+          <a:fillRef idx="1">
+            <a:schemeClr val="accent1"/>
+          </a:fillRef>
+          <a:effectRef idx="0">
+            <a:schemeClr val="accent1"/>
+          </a:effectRef>
+          <a:fontRef idx="minor">
+            <a:schemeClr val="lt1"/>
+          </a:fontRef>
+        </p:style>
+        <p:txBody>
+          <a:bodyPr rtlCol="0" anchor="ctr"/>
+          <a:lstStyle/>
+          <a:p>
+            <a:pPr algn="ctr"/>
+            <a:r>
+              <a:rPr lang="es-ES" dirty="0" smtClean="0"/>
+              <a:t>TECNOLOGÍA</a:t>
+            </a:r>
+          </a:p>
+          <a:p>
+            <a:pPr algn="ctr"/>
+            <a:r>
+              <a:rPr lang="es-ES" dirty="0" smtClean="0"/>
+              <a:t>PANTALLAS</a:t>
+            </a:r>
+          </a:p>
+          <a:p>
+            <a:pPr algn="ctr"/>
+            <a:r>
+              <a:rPr lang="es-ES" dirty="0" smtClean="0"/>
+              <a:t>NAVEGACIÓN</a:t>
+            </a:r>
+            <a:endParaRPr lang="es-ES" dirty="0"/>
+          </a:p>
+        </p:txBody>
+      </p:sp>
+      <p:sp>
+        <p:nvSpPr>
+          <p:cNvPr id="28" name="Rectángulo redondeado 27"/>
+          <p:cNvSpPr/>
+          <p:nvPr/>
+        </p:nvSpPr>
+        <p:spPr>
+          <a:xfrm>
+            <a:off x="1415144" y="3284689"/>
+            <a:ext cx="2011680" cy="770709"/>
+          </a:xfrm>
+          <a:prstGeom prst="roundRect">
+            <a:avLst/>
+          </a:prstGeom>
+        </p:spPr>
+        <p:style>
+          <a:lnRef idx="2">
+            <a:schemeClr val="accent1">
+              <a:shade val="50000"/>
+            </a:schemeClr>
+          </a:lnRef>
+          <a:fillRef idx="1">
+            <a:schemeClr val="accent1"/>
+          </a:fillRef>
+          <a:effectRef idx="0">
+            <a:schemeClr val="accent1"/>
+          </a:effectRef>
+          <a:fontRef idx="minor">
+            <a:schemeClr val="lt1"/>
+          </a:fontRef>
+        </p:style>
+        <p:txBody>
+          <a:bodyPr rtlCol="0" anchor="ctr"/>
+          <a:lstStyle/>
+          <a:p>
+            <a:pPr algn="ctr"/>
+            <a:r>
+              <a:rPr lang="es-ES" dirty="0" smtClean="0"/>
+              <a:t>IMPLENTACIÓN</a:t>
+            </a:r>
+            <a:endParaRPr lang="es-ES" dirty="0"/>
+          </a:p>
+        </p:txBody>
+      </p:sp>
+      <p:sp>
+        <p:nvSpPr>
+          <p:cNvPr id="29" name="Rectángulo 28"/>
+          <p:cNvSpPr/>
+          <p:nvPr/>
+        </p:nvSpPr>
+        <p:spPr>
+          <a:xfrm>
+            <a:off x="4362994" y="3336941"/>
+            <a:ext cx="1502229" cy="666205"/>
+          </a:xfrm>
+          <a:prstGeom prst="rect">
+            <a:avLst/>
+          </a:prstGeom>
+          <a:solidFill>
+            <a:schemeClr val="accent4"/>
+          </a:solidFill>
+        </p:spPr>
+        <p:style>
+          <a:lnRef idx="2">
+            <a:schemeClr val="accent1">
+              <a:shade val="50000"/>
+            </a:schemeClr>
+          </a:lnRef>
+          <a:fillRef idx="1">
+            <a:schemeClr val="accent1"/>
+          </a:fillRef>
+          <a:effectRef idx="0">
+            <a:schemeClr val="accent1"/>
+          </a:effectRef>
+          <a:fontRef idx="minor">
+            <a:schemeClr val="lt1"/>
+          </a:fontRef>
+        </p:style>
+        <p:txBody>
+          <a:bodyPr rtlCol="0" anchor="ctr"/>
+          <a:lstStyle/>
+          <a:p>
+            <a:pPr algn="ctr"/>
+            <a:r>
+              <a:rPr lang="es-ES" dirty="0" smtClean="0"/>
+              <a:t>CÓDIGO</a:t>
+            </a:r>
+            <a:endParaRPr lang="es-ES" dirty="0"/>
+          </a:p>
+        </p:txBody>
+      </p:sp>
+      <p:sp>
+        <p:nvSpPr>
+          <p:cNvPr id="30" name="Rectángulo redondeado 29"/>
+          <p:cNvSpPr/>
+          <p:nvPr/>
+        </p:nvSpPr>
+        <p:spPr>
+          <a:xfrm>
+            <a:off x="7363097" y="3167122"/>
+            <a:ext cx="2838993" cy="770709"/>
+          </a:xfrm>
+          <a:prstGeom prst="roundRect">
+            <a:avLst/>
+          </a:prstGeom>
+          <a:solidFill>
+            <a:schemeClr val="accent6"/>
+          </a:solidFill>
+        </p:spPr>
+        <p:style>
+          <a:lnRef idx="2">
+            <a:schemeClr val="accent1">
+              <a:shade val="50000"/>
+            </a:schemeClr>
+          </a:lnRef>
+          <a:fillRef idx="1">
+            <a:schemeClr val="accent1"/>
+          </a:fillRef>
+          <a:effectRef idx="0">
+            <a:schemeClr val="accent1"/>
+          </a:effectRef>
+          <a:fontRef idx="minor">
+            <a:schemeClr val="lt1"/>
+          </a:fontRef>
+        </p:style>
+        <p:txBody>
+          <a:bodyPr rtlCol="0" anchor="ctr"/>
+          <a:lstStyle/>
+          <a:p>
+            <a:pPr algn="ctr"/>
+            <a:r>
+              <a:rPr lang="es-ES" dirty="0" smtClean="0"/>
+              <a:t>VSCODE</a:t>
+            </a:r>
+            <a:endParaRPr lang="es-ES" dirty="0"/>
+          </a:p>
+        </p:txBody>
+      </p:sp>
+      <p:sp>
+        <p:nvSpPr>
+          <p:cNvPr id="33" name="Rectángulo redondeado 32"/>
+          <p:cNvSpPr/>
+          <p:nvPr/>
+        </p:nvSpPr>
+        <p:spPr>
+          <a:xfrm>
+            <a:off x="7323906" y="4058354"/>
+            <a:ext cx="3230880" cy="1240972"/>
+          </a:xfrm>
+          <a:prstGeom prst="roundRect">
+            <a:avLst/>
+          </a:prstGeom>
+          <a:solidFill>
+            <a:schemeClr val="accent6"/>
+          </a:solidFill>
+        </p:spPr>
+        <p:style>
+          <a:lnRef idx="2">
+            <a:schemeClr val="accent1">
+              <a:shade val="50000"/>
+            </a:schemeClr>
+          </a:lnRef>
+          <a:fillRef idx="1">
+            <a:schemeClr val="accent1"/>
+          </a:fillRef>
+          <a:effectRef idx="0">
+            <a:schemeClr val="accent1"/>
+          </a:effectRef>
+          <a:fontRef idx="minor">
+            <a:schemeClr val="lt1"/>
+          </a:fontRef>
+        </p:style>
+        <p:txBody>
+          <a:bodyPr rtlCol="0" anchor="ctr"/>
+          <a:lstStyle/>
+          <a:p>
+            <a:pPr algn="ctr"/>
+            <a:r>
+              <a:rPr lang="es-ES" dirty="0" smtClean="0"/>
+              <a:t>MANUAL</a:t>
+            </a:r>
+          </a:p>
+          <a:p>
+            <a:pPr algn="ctr"/>
+            <a:r>
+              <a:rPr lang="es-ES" dirty="0" smtClean="0"/>
+              <a:t>DDT/TDD</a:t>
+            </a:r>
+          </a:p>
+          <a:p>
+            <a:pPr algn="ctr"/>
+            <a:r>
+              <a:rPr lang="es-ES" dirty="0" smtClean="0"/>
+              <a:t>KARMA (UNITARIAS)/JASMINE (INTEGRALES)</a:t>
+            </a:r>
+            <a:endParaRPr lang="es-ES" dirty="0"/>
+          </a:p>
+        </p:txBody>
+      </p:sp>
+      <p:sp>
+        <p:nvSpPr>
+          <p:cNvPr id="34" name="Rectángulo redondeado 33"/>
+          <p:cNvSpPr/>
+          <p:nvPr/>
+        </p:nvSpPr>
+        <p:spPr>
+          <a:xfrm>
+            <a:off x="1415144" y="4345738"/>
+            <a:ext cx="2011680" cy="770709"/>
+          </a:xfrm>
+          <a:prstGeom prst="roundRect">
+            <a:avLst/>
+          </a:prstGeom>
+        </p:spPr>
+        <p:style>
+          <a:lnRef idx="2">
+            <a:schemeClr val="accent1">
+              <a:shade val="50000"/>
+            </a:schemeClr>
+          </a:lnRef>
+          <a:fillRef idx="1">
+            <a:schemeClr val="accent1"/>
+          </a:fillRef>
+          <a:effectRef idx="0">
+            <a:schemeClr val="accent1"/>
+          </a:effectRef>
+          <a:fontRef idx="minor">
+            <a:schemeClr val="lt1"/>
+          </a:fontRef>
+        </p:style>
+        <p:txBody>
+          <a:bodyPr rtlCol="0" anchor="ctr"/>
+          <a:lstStyle/>
+          <a:p>
+            <a:pPr algn="ctr"/>
+            <a:r>
+              <a:rPr lang="es-ES" dirty="0" smtClean="0"/>
+              <a:t>PRUEBAS</a:t>
+            </a:r>
+            <a:endParaRPr lang="es-ES" dirty="0"/>
+          </a:p>
+        </p:txBody>
+      </p:sp>
+      <p:sp>
+        <p:nvSpPr>
+          <p:cNvPr id="35" name="Rectángulo 34"/>
+          <p:cNvSpPr/>
+          <p:nvPr/>
+        </p:nvSpPr>
+        <p:spPr>
+          <a:xfrm>
+            <a:off x="4380412" y="4384927"/>
+            <a:ext cx="1502229" cy="666205"/>
+          </a:xfrm>
+          <a:prstGeom prst="rect">
+            <a:avLst/>
+          </a:prstGeom>
+          <a:solidFill>
+            <a:schemeClr val="accent4"/>
+          </a:solidFill>
+        </p:spPr>
+        <p:style>
+          <a:lnRef idx="2">
+            <a:schemeClr val="accent1">
+              <a:shade val="50000"/>
+            </a:schemeClr>
+          </a:lnRef>
+          <a:fillRef idx="1">
+            <a:schemeClr val="accent1"/>
+          </a:fillRef>
+          <a:effectRef idx="0">
+            <a:schemeClr val="accent1"/>
+          </a:effectRef>
+          <a:fontRef idx="minor">
+            <a:schemeClr val="lt1"/>
+          </a:fontRef>
+        </p:style>
+        <p:txBody>
+          <a:bodyPr rtlCol="0" anchor="ctr"/>
+          <a:lstStyle/>
+          <a:p>
+            <a:pPr algn="ctr"/>
+            <a:r>
+              <a:rPr lang="es-ES" dirty="0" smtClean="0"/>
+              <a:t>TEST</a:t>
+            </a:r>
+            <a:endParaRPr lang="es-ES" dirty="0"/>
+          </a:p>
+        </p:txBody>
+      </p:sp>
+      <p:sp>
+        <p:nvSpPr>
+          <p:cNvPr id="36" name="Rectángulo redondeado 35"/>
+          <p:cNvSpPr/>
+          <p:nvPr/>
+        </p:nvSpPr>
+        <p:spPr>
+          <a:xfrm>
+            <a:off x="7323906" y="5436488"/>
+            <a:ext cx="3230880" cy="1240972"/>
+          </a:xfrm>
+          <a:prstGeom prst="roundRect">
+            <a:avLst/>
+          </a:prstGeom>
+          <a:solidFill>
+            <a:schemeClr val="accent6"/>
+          </a:solidFill>
+        </p:spPr>
+        <p:style>
+          <a:lnRef idx="2">
+            <a:schemeClr val="accent1">
+              <a:shade val="50000"/>
+            </a:schemeClr>
+          </a:lnRef>
+          <a:fillRef idx="1">
+            <a:schemeClr val="accent1"/>
+          </a:fillRef>
+          <a:effectRef idx="0">
+            <a:schemeClr val="accent1"/>
+          </a:effectRef>
+          <a:fontRef idx="minor">
+            <a:schemeClr val="lt1"/>
+          </a:fontRef>
+        </p:style>
+        <p:txBody>
+          <a:bodyPr rtlCol="0" anchor="ctr"/>
+          <a:lstStyle/>
+          <a:p>
+            <a:pPr algn="ctr"/>
+            <a:r>
+              <a:rPr lang="es-ES" dirty="0" smtClean="0"/>
+              <a:t>DIAGRAMA DE ACTIVIDAD</a:t>
+            </a:r>
+          </a:p>
+          <a:p>
+            <a:pPr algn="ctr"/>
+            <a:r>
+              <a:rPr lang="es-ES" dirty="0" smtClean="0"/>
+              <a:t>JSDOC</a:t>
+            </a:r>
+          </a:p>
+          <a:p>
+            <a:pPr algn="ctr"/>
+            <a:r>
+              <a:rPr lang="es-ES" dirty="0" smtClean="0"/>
+              <a:t>DOCUMENTACIÓN</a:t>
+            </a:r>
+            <a:endParaRPr lang="es-ES" dirty="0"/>
+          </a:p>
+        </p:txBody>
+      </p:sp>
+      <p:sp>
+        <p:nvSpPr>
+          <p:cNvPr id="37" name="Rectángulo redondeado 36"/>
+          <p:cNvSpPr/>
+          <p:nvPr/>
+        </p:nvSpPr>
+        <p:spPr>
+          <a:xfrm>
+            <a:off x="1375953" y="5351580"/>
+            <a:ext cx="2011680" cy="770709"/>
+          </a:xfrm>
+          <a:prstGeom prst="roundRect">
+            <a:avLst/>
+          </a:prstGeom>
+        </p:spPr>
+        <p:style>
+          <a:lnRef idx="2">
+            <a:schemeClr val="accent1">
+              <a:shade val="50000"/>
+            </a:schemeClr>
+          </a:lnRef>
+          <a:fillRef idx="1">
+            <a:schemeClr val="accent1"/>
+          </a:fillRef>
+          <a:effectRef idx="0">
+            <a:schemeClr val="accent1"/>
+          </a:effectRef>
+          <a:fontRef idx="minor">
+            <a:schemeClr val="lt1"/>
+          </a:fontRef>
+        </p:style>
+        <p:txBody>
+          <a:bodyPr rtlCol="0" anchor="ctr"/>
+          <a:lstStyle/>
+          <a:p>
+            <a:pPr algn="ctr"/>
+            <a:r>
+              <a:rPr lang="es-ES" dirty="0" smtClean="0"/>
+              <a:t>DOCUMENTACIÓN</a:t>
+            </a:r>
+            <a:endParaRPr lang="es-ES" dirty="0"/>
+          </a:p>
+        </p:txBody>
+      </p:sp>
+      <p:sp>
+        <p:nvSpPr>
+          <p:cNvPr id="38" name="Rectángulo 37"/>
+          <p:cNvSpPr/>
+          <p:nvPr/>
+        </p:nvSpPr>
+        <p:spPr>
+          <a:xfrm>
+            <a:off x="4341221" y="5390769"/>
+            <a:ext cx="1889762" cy="666205"/>
+          </a:xfrm>
+          <a:prstGeom prst="rect">
+            <a:avLst/>
+          </a:prstGeom>
+          <a:solidFill>
+            <a:schemeClr val="accent4"/>
+          </a:solidFill>
+        </p:spPr>
+        <p:style>
+          <a:lnRef idx="2">
+            <a:schemeClr val="accent1">
+              <a:shade val="50000"/>
+            </a:schemeClr>
+          </a:lnRef>
+          <a:fillRef idx="1">
+            <a:schemeClr val="accent1"/>
+          </a:fillRef>
+          <a:effectRef idx="0">
+            <a:schemeClr val="accent1"/>
+          </a:effectRef>
+          <a:fontRef idx="minor">
+            <a:schemeClr val="lt1"/>
+          </a:fontRef>
+        </p:style>
+        <p:txBody>
+          <a:bodyPr rtlCol="0" anchor="ctr"/>
+          <a:lstStyle/>
+          <a:p>
+            <a:pPr algn="ctr"/>
+            <a:r>
+              <a:rPr lang="es-ES" dirty="0" smtClean="0"/>
+              <a:t>ESTRUCTURA</a:t>
+            </a:r>
+          </a:p>
+          <a:p>
+            <a:pPr algn="ctr"/>
+            <a:r>
+              <a:rPr lang="es-ES" dirty="0" smtClean="0"/>
+              <a:t>FUNCIOANLIDAD</a:t>
+            </a:r>
+            <a:endParaRPr lang="es-ES" dirty="0"/>
+          </a:p>
+        </p:txBody>
+      </p:sp>
+      <p:sp>
+        <p:nvSpPr>
+          <p:cNvPr id="10" name="Abrir llave 9"/>
+          <p:cNvSpPr/>
+          <p:nvPr/>
+        </p:nvSpPr>
+        <p:spPr>
+          <a:xfrm>
+            <a:off x="422365" y="783771"/>
+            <a:ext cx="557349" cy="5486400"/>
+          </a:xfrm>
+          <a:prstGeom prst="leftBrace">
+            <a:avLst/>
+          </a:prstGeom>
+        </p:spPr>
+        <p:style>
+          <a:lnRef idx="1">
+            <a:schemeClr val="accent1"/>
+          </a:lnRef>
+          <a:fillRef idx="0">
+            <a:schemeClr val="accent1"/>
+          </a:fillRef>
+          <a:effectRef idx="0">
+            <a:schemeClr val="accent1"/>
+          </a:effectRef>
+          <a:fontRef idx="minor">
+            <a:schemeClr val="tx1"/>
+          </a:fontRef>
+        </p:style>
+        <p:txBody>
+          <a:bodyPr rtlCol="0" anchor="ctr"/>
+          <a:lstStyle/>
+          <a:p>
+            <a:pPr algn="ctr"/>
+            <a:r>
+              <a:rPr lang="es-ES" dirty="0" smtClean="0"/>
+              <a:t>GESTIÓN</a:t>
+            </a:r>
+            <a:endParaRPr lang="es-ES" dirty="0"/>
+          </a:p>
+        </p:txBody>
+      </p:sp>
+    </p:spTree>
+    <p:extLst>
+      <p:ext uri="{BB962C8B-B14F-4D97-AF65-F5344CB8AC3E}">
+        <p14:creationId xmlns:p14="http://schemas.microsoft.com/office/powerpoint/2010/main" val="939133820"/>
+      </p:ext>
+    </p:extLst>
+  </p:cSld>
+  <p:clrMapOvr>
+    <a:masterClrMapping/>
+  </p:clrMapOvr>
+</p:sld>
+</file>
+
 <file path=ppt/theme/theme1.xml><?xml version="1.0" encoding="utf-8"?>
 <a:theme xmlns:a="http://schemas.openxmlformats.org/drawingml/2006/main" name="Tema de Office">
   <a:themeElements>

</xml_diff>